<commit_message>
Voeg laatste slide toe
</commit_message>
<xml_diff>
--- a/SIG_CSS_Architecture.pptx
+++ b/SIG_CSS_Architecture.pptx
@@ -30,16 +30,16 @@
     <p:sldId id="284" r:id="rId21"/>
     <p:sldId id="272" r:id="rId22"/>
     <p:sldId id="273" r:id="rId23"/>
-    <p:sldId id="274" r:id="rId24"/>
-    <p:sldId id="269" r:id="rId25"/>
+    <p:sldId id="269" r:id="rId24"/>
+    <p:sldId id="274" r:id="rId25"/>
     <p:sldId id="267" r:id="rId26"/>
     <p:sldId id="258" r:id="rId27"/>
     <p:sldId id="268" r:id="rId28"/>
     <p:sldId id="259" r:id="rId29"/>
     <p:sldId id="266" r:id="rId30"/>
     <p:sldId id="291" r:id="rId31"/>
-    <p:sldId id="260" r:id="rId32"/>
-    <p:sldId id="270" r:id="rId33"/>
+    <p:sldId id="270" r:id="rId32"/>
+    <p:sldId id="260" r:id="rId33"/>
     <p:sldId id="297" r:id="rId34"/>
     <p:sldId id="261" r:id="rId35"/>
     <p:sldId id="262" r:id="rId36"/>
@@ -1000,7 +1000,7 @@
           <a:p>
             <a:fld id="{10CC1388-5806-4682-935F-40A544AE6D98}" type="slidenum">
               <a:rPr lang="en-NL" smtClean="0"/>
-              <a:t>31</a:t>
+              <a:t>30</a:t>
             </a:fld>
             <a:endParaRPr lang="en-NL"/>
           </a:p>
@@ -15319,6 +15319,153 @@
       </p:grpSpPr>
       <p:sp>
         <p:nvSpPr>
+          <p:cNvPr id="2" name="Title 1">
+            <a:extLst>
+              <a:ext uri="{FF2B5EF4-FFF2-40B4-BE49-F238E27FC236}">
+                <a16:creationId xmlns:a16="http://schemas.microsoft.com/office/drawing/2014/main" id="{8E634946-CDEA-4FE7-812A-5ADF160CC427}"/>
+              </a:ext>
+            </a:extLst>
+          </p:cNvPr>
+          <p:cNvSpPr>
+            <a:spLocks noGrp="1"/>
+          </p:cNvSpPr>
+          <p:nvPr>
+            <p:ph type="title"/>
+          </p:nvPr>
+        </p:nvSpPr>
+        <p:spPr/>
+        <p:txBody>
+          <a:bodyPr/>
+          <a:lstStyle/>
+          <a:p>
+            <a:r>
+              <a:rPr lang="nl-NL" dirty="0"/>
+              <a:t>Object </a:t>
+            </a:r>
+            <a:r>
+              <a:rPr lang="nl-NL" dirty="0" err="1"/>
+              <a:t>Oriented</a:t>
+            </a:r>
+            <a:r>
+              <a:rPr lang="nl-NL" dirty="0"/>
+              <a:t> CSS</a:t>
+            </a:r>
+            <a:endParaRPr lang="en-NL" dirty="0"/>
+          </a:p>
+        </p:txBody>
+      </p:sp>
+      <p:sp>
+        <p:nvSpPr>
+          <p:cNvPr id="3" name="Content Placeholder 2">
+            <a:extLst>
+              <a:ext uri="{FF2B5EF4-FFF2-40B4-BE49-F238E27FC236}">
+                <a16:creationId xmlns:a16="http://schemas.microsoft.com/office/drawing/2014/main" id="{3018C4DE-EC9C-44A8-B315-5CBD7A701CE0}"/>
+              </a:ext>
+            </a:extLst>
+          </p:cNvPr>
+          <p:cNvSpPr>
+            <a:spLocks noGrp="1"/>
+          </p:cNvSpPr>
+          <p:nvPr>
+            <p:ph idx="1"/>
+          </p:nvPr>
+        </p:nvSpPr>
+        <p:spPr/>
+        <p:txBody>
+          <a:bodyPr/>
+          <a:lstStyle/>
+          <a:p>
+            <a:r>
+              <a:rPr lang="en-US" dirty="0"/>
+              <a:t>A </a:t>
+            </a:r>
+            <a:r>
+              <a:rPr lang="en-US" dirty="0" err="1"/>
+              <a:t>css</a:t>
+            </a:r>
+            <a:r>
+              <a:rPr lang="en-US" dirty="0"/>
+              <a:t> object is any repeating visual pattern, which can be abstracted into a snippet of html, </a:t>
+            </a:r>
+            <a:r>
+              <a:rPr lang="en-US" dirty="0" err="1"/>
+              <a:t>css</a:t>
+            </a:r>
+            <a:r>
+              <a:rPr lang="en-US" dirty="0"/>
+              <a:t>, and sometimes </a:t>
+            </a:r>
+            <a:r>
+              <a:rPr lang="en-US" dirty="0" err="1"/>
+              <a:t>javascript</a:t>
+            </a:r>
+            <a:r>
+              <a:rPr lang="en-US" dirty="0"/>
+              <a:t>.</a:t>
+            </a:r>
+          </a:p>
+          <a:p>
+            <a:pPr marL="0" indent="0">
+              <a:buNone/>
+            </a:pPr>
+            <a:endParaRPr lang="en-US" dirty="0"/>
+          </a:p>
+          <a:p>
+            <a:r>
+              <a:rPr lang="en-US" dirty="0"/>
+              <a:t>The goal of </a:t>
+            </a:r>
+            <a:r>
+              <a:rPr lang="en-US" dirty="0">
+                <a:hlinkClick r:id="rId2"/>
+              </a:rPr>
+              <a:t>Object Oriented CSS</a:t>
+            </a:r>
+            <a:r>
+              <a:rPr lang="en-US" dirty="0"/>
+              <a:t> is to encourage code reuse for faster and more efficient stylesheets that are easier to maintain.</a:t>
+            </a:r>
+          </a:p>
+          <a:p>
+            <a:endParaRPr lang="en-US" dirty="0"/>
+          </a:p>
+          <a:p>
+            <a:endParaRPr lang="en-NL" dirty="0"/>
+          </a:p>
+        </p:txBody>
+      </p:sp>
+    </p:spTree>
+    <p:extLst>
+      <p:ext uri="{BB962C8B-B14F-4D97-AF65-F5344CB8AC3E}">
+        <p14:creationId xmlns:p14="http://schemas.microsoft.com/office/powerpoint/2010/main" val="1398208315"/>
+      </p:ext>
+    </p:extLst>
+  </p:cSld>
+  <p:clrMapOvr>
+    <a:masterClrMapping/>
+  </p:clrMapOvr>
+</p:sld>
+</file>
+
+<file path=ppt/slides/slide23.xml><?xml version="1.0" encoding="utf-8"?>
+<p:sld xmlns:a="http://schemas.openxmlformats.org/drawingml/2006/main" xmlns:r="http://schemas.openxmlformats.org/officeDocument/2006/relationships" xmlns:p="http://schemas.openxmlformats.org/presentationml/2006/main">
+  <p:cSld>
+    <p:spTree>
+      <p:nvGrpSpPr>
+        <p:cNvPr id="1" name=""/>
+        <p:cNvGrpSpPr/>
+        <p:nvPr/>
+      </p:nvGrpSpPr>
+      <p:grpSpPr>
+        <a:xfrm>
+          <a:off x="0" y="0"/>
+          <a:ext cx="0" cy="0"/>
+          <a:chOff x="0" y="0"/>
+          <a:chExt cx="0" cy="0"/>
+        </a:xfrm>
+      </p:grpSpPr>
+      <p:sp>
+        <p:nvSpPr>
           <p:cNvPr id="7" name="Title 6"/>
           <p:cNvSpPr>
             <a:spLocks noGrp="1"/>
@@ -15459,7 +15606,7 @@
                 <a:latin typeface="Arial" panose="020B0604020202020204"/>
               </a:rPr>
               <a:pPr defTabSz="914377"/>
-              <a:t>22</a:t>
+              <a:t>23</a:t>
             </a:fld>
             <a:endParaRPr lang="nl-NL">
               <a:solidFill>
@@ -15519,153 +15666,6 @@
 </p:sld>
 </file>
 
-<file path=ppt/slides/slide23.xml><?xml version="1.0" encoding="utf-8"?>
-<p:sld xmlns:a="http://schemas.openxmlformats.org/drawingml/2006/main" xmlns:r="http://schemas.openxmlformats.org/officeDocument/2006/relationships" xmlns:p="http://schemas.openxmlformats.org/presentationml/2006/main">
-  <p:cSld>
-    <p:spTree>
-      <p:nvGrpSpPr>
-        <p:cNvPr id="1" name=""/>
-        <p:cNvGrpSpPr/>
-        <p:nvPr/>
-      </p:nvGrpSpPr>
-      <p:grpSpPr>
-        <a:xfrm>
-          <a:off x="0" y="0"/>
-          <a:ext cx="0" cy="0"/>
-          <a:chOff x="0" y="0"/>
-          <a:chExt cx="0" cy="0"/>
-        </a:xfrm>
-      </p:grpSpPr>
-      <p:sp>
-        <p:nvSpPr>
-          <p:cNvPr id="2" name="Title 1">
-            <a:extLst>
-              <a:ext uri="{FF2B5EF4-FFF2-40B4-BE49-F238E27FC236}">
-                <a16:creationId xmlns:a16="http://schemas.microsoft.com/office/drawing/2014/main" id="{8E634946-CDEA-4FE7-812A-5ADF160CC427}"/>
-              </a:ext>
-            </a:extLst>
-          </p:cNvPr>
-          <p:cNvSpPr>
-            <a:spLocks noGrp="1"/>
-          </p:cNvSpPr>
-          <p:nvPr>
-            <p:ph type="title"/>
-          </p:nvPr>
-        </p:nvSpPr>
-        <p:spPr/>
-        <p:txBody>
-          <a:bodyPr/>
-          <a:lstStyle/>
-          <a:p>
-            <a:r>
-              <a:rPr lang="nl-NL" dirty="0"/>
-              <a:t>Object </a:t>
-            </a:r>
-            <a:r>
-              <a:rPr lang="nl-NL" dirty="0" err="1"/>
-              <a:t>Oriented</a:t>
-            </a:r>
-            <a:r>
-              <a:rPr lang="nl-NL" dirty="0"/>
-              <a:t> CSS</a:t>
-            </a:r>
-            <a:endParaRPr lang="en-NL" dirty="0"/>
-          </a:p>
-        </p:txBody>
-      </p:sp>
-      <p:sp>
-        <p:nvSpPr>
-          <p:cNvPr id="3" name="Content Placeholder 2">
-            <a:extLst>
-              <a:ext uri="{FF2B5EF4-FFF2-40B4-BE49-F238E27FC236}">
-                <a16:creationId xmlns:a16="http://schemas.microsoft.com/office/drawing/2014/main" id="{3018C4DE-EC9C-44A8-B315-5CBD7A701CE0}"/>
-              </a:ext>
-            </a:extLst>
-          </p:cNvPr>
-          <p:cNvSpPr>
-            <a:spLocks noGrp="1"/>
-          </p:cNvSpPr>
-          <p:nvPr>
-            <p:ph idx="1"/>
-          </p:nvPr>
-        </p:nvSpPr>
-        <p:spPr/>
-        <p:txBody>
-          <a:bodyPr/>
-          <a:lstStyle/>
-          <a:p>
-            <a:r>
-              <a:rPr lang="en-US" dirty="0"/>
-              <a:t>A </a:t>
-            </a:r>
-            <a:r>
-              <a:rPr lang="en-US" dirty="0" err="1"/>
-              <a:t>css</a:t>
-            </a:r>
-            <a:r>
-              <a:rPr lang="en-US" dirty="0"/>
-              <a:t> object is any repeating visual pattern, which can be abstracted into a snippet of html, </a:t>
-            </a:r>
-            <a:r>
-              <a:rPr lang="en-US" dirty="0" err="1"/>
-              <a:t>css</a:t>
-            </a:r>
-            <a:r>
-              <a:rPr lang="en-US" dirty="0"/>
-              <a:t>, and sometimes </a:t>
-            </a:r>
-            <a:r>
-              <a:rPr lang="en-US" dirty="0" err="1"/>
-              <a:t>javascript</a:t>
-            </a:r>
-            <a:r>
-              <a:rPr lang="en-US" dirty="0"/>
-              <a:t>.</a:t>
-            </a:r>
-          </a:p>
-          <a:p>
-            <a:pPr marL="0" indent="0">
-              <a:buNone/>
-            </a:pPr>
-            <a:endParaRPr lang="en-US" dirty="0"/>
-          </a:p>
-          <a:p>
-            <a:r>
-              <a:rPr lang="en-US" dirty="0"/>
-              <a:t>The goal of </a:t>
-            </a:r>
-            <a:r>
-              <a:rPr lang="en-US" dirty="0">
-                <a:hlinkClick r:id="rId2"/>
-              </a:rPr>
-              <a:t>Object Oriented CSS</a:t>
-            </a:r>
-            <a:r>
-              <a:rPr lang="en-US" dirty="0"/>
-              <a:t> is to encourage code reuse for faster and more efficient stylesheets that are easier to maintain.</a:t>
-            </a:r>
-          </a:p>
-          <a:p>
-            <a:endParaRPr lang="en-US" dirty="0"/>
-          </a:p>
-          <a:p>
-            <a:endParaRPr lang="en-NL" dirty="0"/>
-          </a:p>
-        </p:txBody>
-      </p:sp>
-    </p:spTree>
-    <p:extLst>
-      <p:ext uri="{BB962C8B-B14F-4D97-AF65-F5344CB8AC3E}">
-        <p14:creationId xmlns:p14="http://schemas.microsoft.com/office/powerpoint/2010/main" val="1398208315"/>
-      </p:ext>
-    </p:extLst>
-  </p:cSld>
-  <p:clrMapOvr>
-    <a:masterClrMapping/>
-  </p:clrMapOvr>
-</p:sld>
-</file>
-
 <file path=ppt/slides/slide24.xml><?xml version="1.0" encoding="utf-8"?>
 <p:sld xmlns:a="http://schemas.openxmlformats.org/drawingml/2006/main" xmlns:r="http://schemas.openxmlformats.org/officeDocument/2006/relationships" xmlns:p="http://schemas.openxmlformats.org/presentationml/2006/main">
   <p:cSld>
@@ -15768,6 +15768,13 @@
             <a:endParaRPr lang="en-NL" dirty="0"/>
           </a:p>
           <a:p>
+            <a:endParaRPr lang="nl-NL" dirty="0"/>
+          </a:p>
+          <a:p>
+            <a:r>
+              <a:rPr lang="nl-NL" dirty="0" err="1"/>
+              <a:t>Theming</a:t>
+            </a:r>
             <a:endParaRPr lang="en-NL" dirty="0"/>
           </a:p>
         </p:txBody>
@@ -15848,6 +15855,20 @@
               <a:rPr lang="nl-NL" dirty="0"/>
               <a:t>, Padding, Overflow</a:t>
             </a:r>
+          </a:p>
+          <a:p>
+            <a:endParaRPr lang="nl-NL" dirty="0"/>
+          </a:p>
+          <a:p>
+            <a:r>
+              <a:rPr lang="nl-NL" dirty="0"/>
+              <a:t>Base </a:t>
+            </a:r>
+            <a:r>
+              <a:rPr lang="nl-NL" dirty="0" err="1"/>
+              <a:t>style</a:t>
+            </a:r>
+            <a:endParaRPr lang="nl-NL" dirty="0"/>
           </a:p>
           <a:p>
             <a:endParaRPr lang="en-NL" dirty="0"/>
@@ -15986,8 +16007,8 @@
         </p:blipFill>
         <p:spPr>
           <a:xfrm>
-            <a:off x="838200" y="1825625"/>
-            <a:ext cx="4261061" cy="4351338"/>
+            <a:off x="838200" y="1171575"/>
+            <a:ext cx="4901541" cy="5005388"/>
           </a:xfrm>
         </p:spPr>
       </p:pic>
@@ -16021,8 +16042,8 @@
         </p:blipFill>
         <p:spPr>
           <a:xfrm>
-            <a:off x="6096000" y="1825625"/>
-            <a:ext cx="4467225" cy="3924300"/>
+            <a:off x="6096000" y="1131133"/>
+            <a:ext cx="5257800" cy="4618792"/>
           </a:xfrm>
         </p:spPr>
       </p:pic>
@@ -16123,10 +16144,16 @@
             </a:r>
           </a:p>
           <a:p>
+            <a:endParaRPr lang="en-US" dirty="0"/>
+          </a:p>
+          <a:p>
             <a:r>
               <a:rPr lang="en-US" dirty="0"/>
               <a:t>Avoiding child selectors</a:t>
             </a:r>
+          </a:p>
+          <a:p>
+            <a:endParaRPr lang="en-US" dirty="0"/>
           </a:p>
           <a:p>
             <a:r>
@@ -16230,8 +16257,8 @@
         </p:blipFill>
         <p:spPr>
           <a:xfrm>
-            <a:off x="838200" y="1690688"/>
-            <a:ext cx="2865078" cy="4351338"/>
+            <a:off x="838200" y="1007824"/>
+            <a:ext cx="3314700" cy="5034202"/>
           </a:xfrm>
         </p:spPr>
       </p:pic>
@@ -16265,8 +16292,8 @@
         </p:blipFill>
         <p:spPr>
           <a:xfrm>
-            <a:off x="6096000" y="1690688"/>
-            <a:ext cx="2952750" cy="4114800"/>
+            <a:off x="6096000" y="1056001"/>
+            <a:ext cx="3577935" cy="4986026"/>
           </a:xfrm>
         </p:spPr>
       </p:pic>
@@ -16532,7 +16559,7 @@
         </p:blipFill>
         <p:spPr>
           <a:xfrm>
-            <a:off x="7395410" y="3385485"/>
+            <a:off x="8193316" y="3204510"/>
             <a:ext cx="2141621" cy="2409324"/>
           </a:xfrm>
           <a:prstGeom prst="rect">
@@ -16970,7 +16997,7 @@
           <p:cNvPr id="2" name="Title 1">
             <a:extLst>
               <a:ext uri="{FF2B5EF4-FFF2-40B4-BE49-F238E27FC236}">
-                <a16:creationId xmlns:a16="http://schemas.microsoft.com/office/drawing/2014/main" id="{5DC7EF30-66E5-48BB-BAA4-AE0719D0F1A0}"/>
+                <a16:creationId xmlns:a16="http://schemas.microsoft.com/office/drawing/2014/main" id="{F21E9F68-168D-4FF1-AAEE-BF03F5D102C2}"/>
               </a:ext>
             </a:extLst>
           </p:cNvPr>
@@ -17003,7 +17030,7 @@
           <p:cNvPr id="3" name="Content Placeholder 2">
             <a:extLst>
               <a:ext uri="{FF2B5EF4-FFF2-40B4-BE49-F238E27FC236}">
-                <a16:creationId xmlns:a16="http://schemas.microsoft.com/office/drawing/2014/main" id="{629F5954-EC10-40FA-9DEE-A7E9C742D70A}"/>
+                <a16:creationId xmlns:a16="http://schemas.microsoft.com/office/drawing/2014/main" id="{6581473E-9C1B-4AA7-8887-BD1BF15BA676}"/>
               </a:ext>
             </a:extLst>
           </p:cNvPr>
@@ -17016,59 +17043,28 @@
         </p:nvSpPr>
         <p:spPr/>
         <p:txBody>
-          <a:bodyPr>
-            <a:normAutofit/>
-          </a:bodyPr>
-          <a:lstStyle/>
-          <a:p>
-            <a:r>
-              <a:rPr lang="nl-NL" dirty="0"/>
-              <a:t>Object </a:t>
-            </a:r>
-            <a:r>
-              <a:rPr lang="nl-NL" dirty="0" err="1"/>
-              <a:t>Oriented</a:t>
-            </a:r>
-            <a:endParaRPr lang="nl-NL" dirty="0"/>
-          </a:p>
-          <a:p>
-            <a:endParaRPr lang="nl-NL" dirty="0"/>
-          </a:p>
-          <a:p>
-            <a:r>
-              <a:rPr lang="nl-NL" dirty="0"/>
-              <a:t>Object</a:t>
-            </a:r>
-          </a:p>
-          <a:p>
-            <a:r>
-              <a:rPr lang="nl-NL" dirty="0"/>
-              <a:t>Child-Object</a:t>
-            </a:r>
-          </a:p>
-          <a:p>
-            <a:r>
-              <a:rPr lang="nl-NL" dirty="0" err="1"/>
-              <a:t>Modifiers</a:t>
-            </a:r>
-            <a:endParaRPr lang="nl-NL" dirty="0"/>
-          </a:p>
-          <a:p>
-            <a:r>
-              <a:rPr lang="nl-NL" dirty="0" err="1"/>
-              <a:t>Subclasses</a:t>
-            </a:r>
-            <a:endParaRPr lang="nl-NL" dirty="0"/>
-          </a:p>
-          <a:p>
-            <a:endParaRPr lang="nl-NL" dirty="0"/>
+          <a:bodyPr/>
+          <a:lstStyle/>
+          <a:p>
+            <a:r>
+              <a:rPr lang="en-US" i="1" dirty="0"/>
+              <a:t>Oxygen is an object-oriented approach to CSS. It is designed to give teams a simple and consistent way to communicate about stylesheets. </a:t>
+            </a:r>
+            <a:endParaRPr lang="en-US" dirty="0"/>
+          </a:p>
+          <a:p>
+            <a:r>
+              <a:rPr lang="en-US" dirty="0"/>
+              <a:t>We naturally speak in terms of objects when talking about “buttons”, “menus”, and “controls.”</a:t>
+            </a:r>
+            <a:endParaRPr lang="en-NL" dirty="0"/>
           </a:p>
         </p:txBody>
       </p:sp>
     </p:spTree>
     <p:extLst>
       <p:ext uri="{BB962C8B-B14F-4D97-AF65-F5344CB8AC3E}">
-        <p14:creationId xmlns:p14="http://schemas.microsoft.com/office/powerpoint/2010/main" val="954262085"/>
+        <p14:creationId xmlns:p14="http://schemas.microsoft.com/office/powerpoint/2010/main" val="1255628608"/>
       </p:ext>
     </p:extLst>
   </p:cSld>
@@ -17100,7 +17096,7 @@
           <p:cNvPr id="2" name="Title 1">
             <a:extLst>
               <a:ext uri="{FF2B5EF4-FFF2-40B4-BE49-F238E27FC236}">
-                <a16:creationId xmlns:a16="http://schemas.microsoft.com/office/drawing/2014/main" id="{F21E9F68-168D-4FF1-AAEE-BF03F5D102C2}"/>
+                <a16:creationId xmlns:a16="http://schemas.microsoft.com/office/drawing/2014/main" id="{5DC7EF30-66E5-48BB-BAA4-AE0719D0F1A0}"/>
               </a:ext>
             </a:extLst>
           </p:cNvPr>
@@ -17133,7 +17129,7 @@
           <p:cNvPr id="3" name="Content Placeholder 2">
             <a:extLst>
               <a:ext uri="{FF2B5EF4-FFF2-40B4-BE49-F238E27FC236}">
-                <a16:creationId xmlns:a16="http://schemas.microsoft.com/office/drawing/2014/main" id="{6581473E-9C1B-4AA7-8887-BD1BF15BA676}"/>
+                <a16:creationId xmlns:a16="http://schemas.microsoft.com/office/drawing/2014/main" id="{629F5954-EC10-40FA-9DEE-A7E9C742D70A}"/>
               </a:ext>
             </a:extLst>
           </p:cNvPr>
@@ -17146,28 +17142,45 @@
         </p:nvSpPr>
         <p:spPr/>
         <p:txBody>
-          <a:bodyPr/>
-          <a:lstStyle/>
-          <a:p>
-            <a:r>
-              <a:rPr lang="en-US" i="1" dirty="0"/>
-              <a:t>Oxygen is an object-oriented approach to CSS. It is designed to give teams a simple and consistent way to communicate about stylesheets. </a:t>
-            </a:r>
-            <a:endParaRPr lang="en-US" dirty="0"/>
-          </a:p>
-          <a:p>
-            <a:r>
-              <a:rPr lang="en-US" dirty="0"/>
-              <a:t>We naturally speak in terms of objects when talking about “buttons”, “menus”, and “controls.”</a:t>
-            </a:r>
-            <a:endParaRPr lang="en-NL" dirty="0"/>
+          <a:bodyPr>
+            <a:normAutofit/>
+          </a:bodyPr>
+          <a:lstStyle/>
+          <a:p>
+            <a:r>
+              <a:rPr lang="nl-NL" dirty="0"/>
+              <a:t>Object</a:t>
+            </a:r>
+          </a:p>
+          <a:p>
+            <a:r>
+              <a:rPr lang="nl-NL" dirty="0"/>
+              <a:t>Child-Object</a:t>
+            </a:r>
+          </a:p>
+          <a:p>
+            <a:r>
+              <a:rPr lang="nl-NL" dirty="0" err="1"/>
+              <a:t>Modifiers</a:t>
+            </a:r>
+            <a:endParaRPr lang="nl-NL" dirty="0"/>
+          </a:p>
+          <a:p>
+            <a:r>
+              <a:rPr lang="nl-NL" dirty="0" err="1"/>
+              <a:t>Subclasses</a:t>
+            </a:r>
+            <a:endParaRPr lang="nl-NL" dirty="0"/>
+          </a:p>
+          <a:p>
+            <a:endParaRPr lang="nl-NL" dirty="0"/>
           </a:p>
         </p:txBody>
       </p:sp>
     </p:spTree>
     <p:extLst>
       <p:ext uri="{BB962C8B-B14F-4D97-AF65-F5344CB8AC3E}">
-        <p14:creationId xmlns:p14="http://schemas.microsoft.com/office/powerpoint/2010/main" val="1255628608"/>
+        <p14:creationId xmlns:p14="http://schemas.microsoft.com/office/powerpoint/2010/main" val="954262085"/>
       </p:ext>
     </p:extLst>
   </p:cSld>
@@ -18301,125 +18314,87 @@
           <a:lstStyle/>
           <a:p>
             <a:r>
+              <a:rPr lang="nl-NL" dirty="0" err="1"/>
+              <a:t>Bloat</a:t>
+            </a:r>
+            <a:r>
               <a:rPr lang="nl-NL" dirty="0"/>
-              <a:t>Uitleg </a:t>
-            </a:r>
-            <a:r>
-              <a:rPr lang="nl-NL" dirty="0" err="1"/>
-              <a:t>bloat</a:t>
-            </a:r>
-            <a:r>
-              <a:rPr lang="nl-NL" dirty="0"/>
-              <a:t> </a:t>
-            </a:r>
-            <a:r>
-              <a:rPr lang="nl-NL" dirty="0" err="1"/>
-              <a:t>css</a:t>
+              <a:t> CSS</a:t>
             </a:r>
             <a:endParaRPr lang="en-NL" dirty="0"/>
           </a:p>
         </p:txBody>
       </p:sp>
-      <p:sp>
-        <p:nvSpPr>
-          <p:cNvPr id="5" name="Content Placeholder 4">
+      <p:pic>
+        <p:nvPicPr>
+          <p:cNvPr id="10" name="Content Placeholder 9" descr="A screenshot of a cell phone screen with text&#10;&#10;Description automatically generated">
             <a:extLst>
               <a:ext uri="{FF2B5EF4-FFF2-40B4-BE49-F238E27FC236}">
-                <a16:creationId xmlns:a16="http://schemas.microsoft.com/office/drawing/2014/main" id="{26964814-D1BE-404A-B0B3-5E8CC0474DD6}"/>
+                <a16:creationId xmlns:a16="http://schemas.microsoft.com/office/drawing/2014/main" id="{16CC2F17-24C2-4FA6-BDC3-D70456CAFACB}"/>
               </a:ext>
             </a:extLst>
           </p:cNvPr>
-          <p:cNvSpPr>
-            <a:spLocks noGrp="1"/>
-          </p:cNvSpPr>
+          <p:cNvPicPr>
+            <a:picLocks noGrp="1" noChangeAspect="1"/>
+          </p:cNvPicPr>
           <p:nvPr>
             <p:ph idx="1"/>
           </p:nvPr>
-        </p:nvSpPr>
-        <p:spPr/>
-        <p:txBody>
-          <a:bodyPr/>
-          <a:lstStyle/>
-          <a:p>
-            <a:endParaRPr lang="en-NL"/>
-          </a:p>
-        </p:txBody>
-      </p:sp>
-      <p:sp>
-        <p:nvSpPr>
-          <p:cNvPr id="6" name="Text Placeholder 5">
+        </p:nvPicPr>
+        <p:blipFill>
+          <a:blip r:embed="rId2">
+            <a:extLst>
+              <a:ext uri="{28A0092B-C50C-407E-A947-70E740481C1C}">
+                <a14:useLocalDpi xmlns:a14="http://schemas.microsoft.com/office/drawing/2010/main" val="0"/>
+              </a:ext>
+            </a:extLst>
+          </a:blip>
+          <a:stretch>
+            <a:fillRect/>
+          </a:stretch>
+        </p:blipFill>
+        <p:spPr>
+          <a:xfrm>
+            <a:off x="1297649" y="1055688"/>
+            <a:ext cx="4318264" cy="5232400"/>
+          </a:xfrm>
+        </p:spPr>
+      </p:pic>
+      <p:pic>
+        <p:nvPicPr>
+          <p:cNvPr id="12" name="Content Placeholder 11" descr="A close up of text on a black background&#10;&#10;Description automatically generated">
             <a:extLst>
               <a:ext uri="{FF2B5EF4-FFF2-40B4-BE49-F238E27FC236}">
-                <a16:creationId xmlns:a16="http://schemas.microsoft.com/office/drawing/2014/main" id="{3A1E568F-40B9-4B2E-B938-1B8EA6CB97A1}"/>
+                <a16:creationId xmlns:a16="http://schemas.microsoft.com/office/drawing/2014/main" id="{10AC4F90-1C9A-4F6C-9B1E-8DA26C0A9AE2}"/>
               </a:ext>
             </a:extLst>
           </p:cNvPr>
-          <p:cNvSpPr>
-            <a:spLocks noGrp="1"/>
-          </p:cNvSpPr>
-          <p:nvPr>
-            <p:ph type="body" idx="13"/>
-          </p:nvPr>
-        </p:nvSpPr>
-        <p:spPr/>
-        <p:txBody>
-          <a:bodyPr/>
-          <a:lstStyle/>
-          <a:p>
-            <a:endParaRPr lang="en-NL"/>
-          </a:p>
-        </p:txBody>
-      </p:sp>
-      <p:sp>
-        <p:nvSpPr>
-          <p:cNvPr id="7" name="Content Placeholder 6">
+          <p:cNvPicPr>
+            <a:picLocks noGrp="1" noChangeAspect="1"/>
+          </p:cNvPicPr>
+          <p:nvPr>
+            <p:ph idx="14"/>
+          </p:nvPr>
+        </p:nvPicPr>
+        <p:blipFill>
+          <a:blip r:embed="rId3">
             <a:extLst>
-              <a:ext uri="{FF2B5EF4-FFF2-40B4-BE49-F238E27FC236}">
-                <a16:creationId xmlns:a16="http://schemas.microsoft.com/office/drawing/2014/main" id="{2FE2EFC6-91C1-4793-B083-25DC51960DBC}"/>
+              <a:ext uri="{28A0092B-C50C-407E-A947-70E740481C1C}">
+                <a14:useLocalDpi xmlns:a14="http://schemas.microsoft.com/office/drawing/2010/main" val="0"/>
               </a:ext>
             </a:extLst>
-          </p:cNvPr>
-          <p:cNvSpPr>
-            <a:spLocks noGrp="1"/>
-          </p:cNvSpPr>
-          <p:nvPr>
-            <p:ph idx="14"/>
-          </p:nvPr>
-        </p:nvSpPr>
-        <p:spPr/>
-        <p:txBody>
-          <a:bodyPr/>
-          <a:lstStyle/>
-          <a:p>
-            <a:endParaRPr lang="en-NL"/>
-          </a:p>
-        </p:txBody>
-      </p:sp>
-      <p:sp>
-        <p:nvSpPr>
-          <p:cNvPr id="8" name="Text Placeholder 7">
-            <a:extLst>
-              <a:ext uri="{FF2B5EF4-FFF2-40B4-BE49-F238E27FC236}">
-                <a16:creationId xmlns:a16="http://schemas.microsoft.com/office/drawing/2014/main" id="{2A87AF8F-E7EF-4DDA-9EC3-5576738450D1}"/>
-              </a:ext>
-            </a:extLst>
-          </p:cNvPr>
-          <p:cNvSpPr>
-            <a:spLocks noGrp="1"/>
-          </p:cNvSpPr>
-          <p:nvPr>
-            <p:ph type="body" idx="15"/>
-          </p:nvPr>
-        </p:nvSpPr>
-        <p:spPr/>
-        <p:txBody>
-          <a:bodyPr/>
-          <a:lstStyle/>
-          <a:p>
-            <a:endParaRPr lang="en-NL"/>
-          </a:p>
-        </p:txBody>
-      </p:sp>
+          </a:blip>
+          <a:stretch>
+            <a:fillRect/>
+          </a:stretch>
+        </p:blipFill>
+        <p:spPr>
+          <a:xfrm>
+            <a:off x="6477603" y="1055688"/>
+            <a:ext cx="4515231" cy="5232400"/>
+          </a:xfrm>
+        </p:spPr>
+      </p:pic>
     </p:spTree>
     <p:extLst>
       <p:ext uri="{BB962C8B-B14F-4D97-AF65-F5344CB8AC3E}">

</xml_diff>